<commit_message>
Update presentation and notebooks for 2020 beginners session
</commit_message>
<xml_diff>
--- a/for_beginners/Python for Beginners.pptx
+++ b/for_beginners/Python for Beginners.pptx
@@ -1,6 +1,6 @@
 
 <file path=ppt/presentation.xml><?xml version="1.0" encoding="utf-8"?>
-<p:presentation xmlns:a="http://schemas.openxmlformats.org/drawingml/2006/main" xmlns:r="http://schemas.openxmlformats.org/officeDocument/2006/relationships" xmlns:p="http://schemas.openxmlformats.org/presentationml/2006/main" saveSubsetFonts="1">
+<p:presentation xmlns:a="http://schemas.openxmlformats.org/drawingml/2006/main" xmlns:r="http://schemas.openxmlformats.org/officeDocument/2006/relationships" xmlns:p="http://schemas.openxmlformats.org/presentationml/2006/main" removePersonalInfoOnSave="1" saveSubsetFonts="1">
   <p:sldMasterIdLst>
     <p:sldMasterId id="2147483648" r:id="rId1"/>
   </p:sldMasterIdLst>
@@ -12,7 +12,8 @@
     <p:sldId id="261" r:id="rId6"/>
     <p:sldId id="266" r:id="rId7"/>
     <p:sldId id="260" r:id="rId8"/>
-    <p:sldId id="269" r:id="rId9"/>
+    <p:sldId id="270" r:id="rId9"/>
+    <p:sldId id="269" r:id="rId10"/>
   </p:sldIdLst>
   <p:sldSz cx="12192000" cy="6858000"/>
   <p:notesSz cx="6858000" cy="9144000"/>
@@ -250,7 +251,7 @@
           <a:p>
             <a:fld id="{DB2D40D2-DA59-418F-9676-2E287E608FAF}" type="datetimeFigureOut">
               <a:rPr lang="de-CH" smtClean="0"/>
-              <a:t>26.11.2019</a:t>
+              <a:t>20.10.2020</a:t>
             </a:fld>
             <a:endParaRPr lang="de-CH"/>
           </a:p>
@@ -420,7 +421,7 @@
           <a:p>
             <a:fld id="{DB2D40D2-DA59-418F-9676-2E287E608FAF}" type="datetimeFigureOut">
               <a:rPr lang="de-CH" smtClean="0"/>
-              <a:t>26.11.2019</a:t>
+              <a:t>20.10.2020</a:t>
             </a:fld>
             <a:endParaRPr lang="de-CH"/>
           </a:p>
@@ -600,7 +601,7 @@
           <a:p>
             <a:fld id="{DB2D40D2-DA59-418F-9676-2E287E608FAF}" type="datetimeFigureOut">
               <a:rPr lang="de-CH" smtClean="0"/>
-              <a:t>26.11.2019</a:t>
+              <a:t>20.10.2020</a:t>
             </a:fld>
             <a:endParaRPr lang="de-CH"/>
           </a:p>
@@ -770,7 +771,7 @@
           <a:p>
             <a:fld id="{DB2D40D2-DA59-418F-9676-2E287E608FAF}" type="datetimeFigureOut">
               <a:rPr lang="de-CH" smtClean="0"/>
-              <a:t>26.11.2019</a:t>
+              <a:t>20.10.2020</a:t>
             </a:fld>
             <a:endParaRPr lang="de-CH"/>
           </a:p>
@@ -1016,7 +1017,7 @@
           <a:p>
             <a:fld id="{DB2D40D2-DA59-418F-9676-2E287E608FAF}" type="datetimeFigureOut">
               <a:rPr lang="de-CH" smtClean="0"/>
-              <a:t>26.11.2019</a:t>
+              <a:t>20.10.2020</a:t>
             </a:fld>
             <a:endParaRPr lang="de-CH"/>
           </a:p>
@@ -1248,7 +1249,7 @@
           <a:p>
             <a:fld id="{DB2D40D2-DA59-418F-9676-2E287E608FAF}" type="datetimeFigureOut">
               <a:rPr lang="de-CH" smtClean="0"/>
-              <a:t>26.11.2019</a:t>
+              <a:t>20.10.2020</a:t>
             </a:fld>
             <a:endParaRPr lang="de-CH"/>
           </a:p>
@@ -1615,7 +1616,7 @@
           <a:p>
             <a:fld id="{DB2D40D2-DA59-418F-9676-2E287E608FAF}" type="datetimeFigureOut">
               <a:rPr lang="de-CH" smtClean="0"/>
-              <a:t>26.11.2019</a:t>
+              <a:t>20.10.2020</a:t>
             </a:fld>
             <a:endParaRPr lang="de-CH"/>
           </a:p>
@@ -1733,7 +1734,7 @@
           <a:p>
             <a:fld id="{DB2D40D2-DA59-418F-9676-2E287E608FAF}" type="datetimeFigureOut">
               <a:rPr lang="de-CH" smtClean="0"/>
-              <a:t>26.11.2019</a:t>
+              <a:t>20.10.2020</a:t>
             </a:fld>
             <a:endParaRPr lang="de-CH"/>
           </a:p>
@@ -1828,7 +1829,7 @@
           <a:p>
             <a:fld id="{DB2D40D2-DA59-418F-9676-2E287E608FAF}" type="datetimeFigureOut">
               <a:rPr lang="de-CH" smtClean="0"/>
-              <a:t>26.11.2019</a:t>
+              <a:t>20.10.2020</a:t>
             </a:fld>
             <a:endParaRPr lang="de-CH"/>
           </a:p>
@@ -2105,7 +2106,7 @@
           <a:p>
             <a:fld id="{DB2D40D2-DA59-418F-9676-2E287E608FAF}" type="datetimeFigureOut">
               <a:rPr lang="de-CH" smtClean="0"/>
-              <a:t>26.11.2019</a:t>
+              <a:t>20.10.2020</a:t>
             </a:fld>
             <a:endParaRPr lang="de-CH"/>
           </a:p>
@@ -2358,7 +2359,7 @@
           <a:p>
             <a:fld id="{DB2D40D2-DA59-418F-9676-2E287E608FAF}" type="datetimeFigureOut">
               <a:rPr lang="de-CH" smtClean="0"/>
-              <a:t>26.11.2019</a:t>
+              <a:t>20.10.2020</a:t>
             </a:fld>
             <a:endParaRPr lang="de-CH"/>
           </a:p>
@@ -2571,7 +2572,7 @@
           <a:p>
             <a:fld id="{DB2D40D2-DA59-418F-9676-2E287E608FAF}" type="datetimeFigureOut">
               <a:rPr lang="de-CH" smtClean="0"/>
-              <a:t>26.11.2019</a:t>
+              <a:t>20.10.2020</a:t>
             </a:fld>
             <a:endParaRPr lang="de-CH"/>
           </a:p>
@@ -2988,8 +2989,8 @@
         </p:nvSpPr>
         <p:spPr>
           <a:xfrm>
-            <a:off x="1524000" y="3607900"/>
-            <a:ext cx="9144000" cy="1655762"/>
+            <a:off x="1523997" y="2995399"/>
+            <a:ext cx="9144000" cy="2461006"/>
           </a:xfrm>
         </p:spPr>
         <p:txBody>
@@ -2999,10 +3000,27 @@
           <a:lstStyle/>
           <a:p>
             <a:r>
-              <a:rPr lang="en-US" sz="2800" dirty="0"/>
-              <a:t>FAIM Python Course for Beginners</a:t>
-            </a:r>
-            <a:endParaRPr lang="de-CH" sz="2800" dirty="0"/>
+              <a:rPr lang="en-US" sz="3200" dirty="0"/>
+              <a:t>FAIM Python Course – Session 1</a:t>
+            </a:r>
+          </a:p>
+          <a:p>
+            <a:r>
+              <a:rPr lang="en-US" sz="3200" dirty="0"/>
+              <a:t>Introduction for Beginners</a:t>
+            </a:r>
+          </a:p>
+          <a:p>
+            <a:endParaRPr lang="en-US" sz="2600" dirty="0"/>
+          </a:p>
+          <a:p>
+            <a:r>
+              <a:rPr lang="de-CH" dirty="0">
+                <a:hlinkClick r:id="rId2"/>
+              </a:rPr>
+              <a:t>benjamin.titze@fmi.ch</a:t>
+            </a:r>
+            <a:endParaRPr lang="de-CH" dirty="0"/>
           </a:p>
         </p:txBody>
       </p:sp>
@@ -3015,7 +3033,7 @@
           <p:nvPr/>
         </p:nvPicPr>
         <p:blipFill>
-          <a:blip r:embed="rId2">
+          <a:blip r:embed="rId3">
             <a:extLst>
               <a:ext uri="{28A0092B-C50C-407E-A947-70E740481C1C}">
                 <a14:useLocalDpi xmlns:a14="http://schemas.microsoft.com/office/drawing/2010/main" val="0"/>
@@ -3028,8 +3046,8 @@
         </p:blipFill>
         <p:spPr>
           <a:xfrm>
-            <a:off x="3830573" y="1972005"/>
-            <a:ext cx="4530854" cy="1530388"/>
+            <a:off x="3998084" y="1578173"/>
+            <a:ext cx="4195827" cy="1417226"/>
           </a:xfrm>
           <a:prstGeom prst="rect">
             <a:avLst/>
@@ -3044,8 +3062,8 @@
         </p:nvSpPr>
         <p:spPr>
           <a:xfrm>
-            <a:off x="7133771" y="6394939"/>
-            <a:ext cx="4940999" cy="369332"/>
+            <a:off x="10348686" y="6455899"/>
+            <a:ext cx="1773014" cy="338554"/>
           </a:xfrm>
           <a:prstGeom prst="rect">
             <a:avLst/>
@@ -3060,16 +3078,64 @@
           <a:p>
             <a:pPr algn="r"/>
             <a:r>
-              <a:rPr lang="en-US" dirty="0">
+              <a:rPr lang="en-US" sz="1600" dirty="0">
                 <a:solidFill>
                   <a:schemeClr val="bg1">
                     <a:lumMod val="65000"/>
                   </a:schemeClr>
                 </a:solidFill>
               </a:rPr>
-              <a:t>27 November 2019 | benjamin.titze@fmi.ch</a:t>
-            </a:r>
-            <a:endParaRPr lang="de-CH" dirty="0">
+              <a:t>21 October 2020</a:t>
+            </a:r>
+            <a:endParaRPr lang="de-CH" sz="1600" dirty="0">
+              <a:solidFill>
+                <a:schemeClr val="bg1">
+                  <a:lumMod val="65000"/>
+                </a:schemeClr>
+              </a:solidFill>
+            </a:endParaRPr>
+          </a:p>
+        </p:txBody>
+      </p:sp>
+      <p:sp>
+        <p:nvSpPr>
+          <p:cNvPr id="10" name="TextBox 9">
+            <a:extLst>
+              <a:ext uri="{FF2B5EF4-FFF2-40B4-BE49-F238E27FC236}">
+                <a16:creationId xmlns:a16="http://schemas.microsoft.com/office/drawing/2014/main" id="{2165A71C-5DF7-4DBA-A4E6-049AD129B4A1}"/>
+              </a:ext>
+            </a:extLst>
+          </p:cNvPr>
+          <p:cNvSpPr txBox="1"/>
+          <p:nvPr/>
+        </p:nvSpPr>
+        <p:spPr>
+          <a:xfrm>
+            <a:off x="70300" y="6455899"/>
+            <a:ext cx="6096000" cy="338554"/>
+          </a:xfrm>
+          <a:prstGeom prst="rect">
+            <a:avLst/>
+          </a:prstGeom>
+          <a:noFill/>
+        </p:spPr>
+        <p:txBody>
+          <a:bodyPr wrap="square">
+            <a:spAutoFit/>
+          </a:bodyPr>
+          <a:lstStyle/>
+          <a:p>
+            <a:r>
+              <a:rPr lang="en-US" sz="1600" dirty="0">
+                <a:solidFill>
+                  <a:schemeClr val="bg1">
+                    <a:lumMod val="65000"/>
+                  </a:schemeClr>
+                </a:solidFill>
+              </a:rPr>
+              <a:t>Facility for Advanced Imaging and Microscopy (FAIM)</a:t>
+            </a:r>
+            <a:endParaRPr lang="de-CH" sz="1600" dirty="0">
               <a:solidFill>
                 <a:schemeClr val="bg1">
                   <a:lumMod val="65000"/>
@@ -3125,7 +3191,7 @@
         </p:nvSpPr>
         <p:spPr>
           <a:xfrm>
-            <a:off x="2402119" y="1328054"/>
+            <a:off x="2416633" y="1335311"/>
             <a:ext cx="7300686" cy="4223659"/>
           </a:xfrm>
           <a:prstGeom prst="rect">
@@ -3664,8 +3730,8 @@
         </p:nvSpPr>
         <p:spPr>
           <a:xfrm>
-            <a:off x="620204" y="295029"/>
-            <a:ext cx="4818185" cy="461665"/>
+            <a:off x="228319" y="216731"/>
+            <a:ext cx="4818185" cy="523220"/>
           </a:xfrm>
           <a:prstGeom prst="rect">
             <a:avLst/>
@@ -3679,10 +3745,10 @@
           <a:lstStyle/>
           <a:p>
             <a:r>
-              <a:rPr lang="en-US" sz="2400" dirty="0"/>
+              <a:rPr lang="en-US" sz="2800" b="1" dirty="0"/>
               <a:t>A brief history of Python</a:t>
             </a:r>
-            <a:endParaRPr lang="de-CH" sz="2400" dirty="0"/>
+            <a:endParaRPr lang="de-CH" sz="2800" b="1" dirty="0"/>
           </a:p>
         </p:txBody>
       </p:sp>
@@ -3708,8 +3774,8 @@
         </p:blipFill>
         <p:spPr>
           <a:xfrm>
-            <a:off x="725713" y="1139239"/>
-            <a:ext cx="2402114" cy="2887875"/>
+            <a:off x="745532" y="1117466"/>
+            <a:ext cx="3066622" cy="3686761"/>
           </a:xfrm>
           <a:prstGeom prst="rect">
             <a:avLst/>
@@ -3724,8 +3790,8 @@
         </p:nvSpPr>
         <p:spPr>
           <a:xfrm>
-            <a:off x="620204" y="4186096"/>
-            <a:ext cx="3175001" cy="2246769"/>
+            <a:off x="658447" y="4844807"/>
+            <a:ext cx="3342196" cy="1554272"/>
           </a:xfrm>
           <a:prstGeom prst="rect">
             <a:avLst/>
@@ -3739,31 +3805,40 @@
           <a:lstStyle/>
           <a:p>
             <a:r>
-              <a:rPr lang="en-US" sz="2000" dirty="0"/>
+              <a:rPr lang="en-US" sz="1900" dirty="0"/>
               <a:t>Created by </a:t>
             </a:r>
             <a:r>
-              <a:rPr lang="en-US" sz="2000" b="1" dirty="0"/>
+              <a:rPr lang="en-US" sz="1900" b="1" dirty="0"/>
               <a:t>Guido van Rossum</a:t>
             </a:r>
             <a:r>
-              <a:rPr lang="en-US" sz="2000" dirty="0"/>
-              <a:t> at CWI, Amsterdam.</a:t>
-            </a:r>
-          </a:p>
-          <a:p>
-            <a:r>
-              <a:rPr lang="en-US" sz="2000" dirty="0"/>
-              <a:t>Released in 1991.</a:t>
-            </a:r>
-          </a:p>
-          <a:p>
-            <a:endParaRPr lang="en-US" sz="2000" dirty="0"/>
-          </a:p>
-          <a:p>
-            <a:r>
-              <a:rPr lang="en-US" sz="2000" dirty="0"/>
-              <a:t>Van Rossum was Python’s BDFL (Benevolent Dictator for Life) until July 2018.  </a:t>
+              <a:rPr lang="en-US" sz="1900" dirty="0"/>
+              <a:t> </a:t>
+            </a:r>
+          </a:p>
+          <a:p>
+            <a:r>
+              <a:rPr lang="en-US" sz="1900" dirty="0"/>
+              <a:t>at CWI, Amsterdam. First </a:t>
+            </a:r>
+          </a:p>
+          <a:p>
+            <a:r>
+              <a:rPr lang="en-US" sz="1900" dirty="0"/>
+              <a:t>release in 1991. Van Rossum </a:t>
+            </a:r>
+          </a:p>
+          <a:p>
+            <a:r>
+              <a:rPr lang="en-US" sz="1900" dirty="0"/>
+              <a:t>was Python’s ‘Benevolent </a:t>
+            </a:r>
+          </a:p>
+          <a:p>
+            <a:r>
+              <a:rPr lang="en-US" sz="1900" dirty="0"/>
+              <a:t>Dictator for Life’ until 2018.  </a:t>
             </a:r>
           </a:p>
         </p:txBody>
@@ -3776,8 +3851,8 @@
         </p:nvSpPr>
         <p:spPr>
           <a:xfrm>
-            <a:off x="4003003" y="1139108"/>
-            <a:ext cx="7187510" cy="5324535"/>
+            <a:off x="4699283" y="872065"/>
+            <a:ext cx="6574970" cy="5647700"/>
           </a:xfrm>
           <a:prstGeom prst="rect">
             <a:avLst/>
@@ -3791,114 +3866,126 @@
           <a:lstStyle/>
           <a:p>
             <a:r>
-              <a:rPr lang="en-US" sz="2000" dirty="0"/>
-              <a:t>Started out as a “hobby programming project” to bridge the gap between shell scripts and C.</a:t>
-            </a:r>
-          </a:p>
-          <a:p>
-            <a:endParaRPr lang="en-US" sz="2000" dirty="0"/>
-          </a:p>
-          <a:p>
-            <a:r>
-              <a:rPr lang="en-US" sz="2000" dirty="0"/>
-              <a:t>Named after the British comedy group ‘Monty Python’, but the logo is inspired by the snake. </a:t>
-            </a:r>
-          </a:p>
-          <a:p>
-            <a:endParaRPr lang="en-US" sz="2000" dirty="0"/>
-          </a:p>
-          <a:p>
-            <a:r>
-              <a:rPr lang="en-US" sz="2000" dirty="0"/>
+              <a:rPr lang="en-US" sz="1900" dirty="0"/>
+              <a:t>Started out as a ‘hobby programming project’ to bridge the gap between shell scripts and C. Named after the British comedy group ‘Monty Python’, but the logo is inspired by the snake. </a:t>
+            </a:r>
+          </a:p>
+          <a:p>
+            <a:endParaRPr lang="en-US" sz="1900" dirty="0"/>
+          </a:p>
+          <a:p>
+            <a:r>
+              <a:rPr lang="en-US" sz="1900" dirty="0"/>
+              <a:t>Now developed and maintained by a large international community. Python Foundation (governance, releases, documentation): </a:t>
+            </a:r>
+            <a:r>
+              <a:rPr lang="en-US" sz="1900" dirty="0">
+                <a:hlinkClick r:id="rId3"/>
+              </a:rPr>
+              <a:t>https://www.python.org</a:t>
+            </a:r>
+            <a:r>
+              <a:rPr lang="en-US" sz="1900" dirty="0"/>
+              <a:t>  </a:t>
+            </a:r>
+          </a:p>
+          <a:p>
+            <a:endParaRPr lang="en-US" sz="1900" dirty="0"/>
+          </a:p>
+          <a:p>
+            <a:r>
+              <a:rPr lang="en-US" sz="1900" dirty="0"/>
               <a:t>Python 1.0 – 1994</a:t>
             </a:r>
           </a:p>
           <a:p>
             <a:r>
-              <a:rPr lang="en-US" sz="2000" dirty="0"/>
+              <a:rPr lang="en-US" sz="1900" dirty="0"/>
               <a:t>   </a:t>
             </a:r>
             <a:r>
-              <a:rPr lang="en-US" sz="2000" dirty="0">
+              <a:rPr lang="en-US" sz="1900" dirty="0">
                 <a:latin typeface="Arial" panose="020B0604020202020204" pitchFamily="34" charset="0"/>
                 <a:cs typeface="Arial" panose="020B0604020202020204" pitchFamily="34" charset="0"/>
               </a:rPr>
               <a:t>→</a:t>
             </a:r>
             <a:r>
-              <a:rPr lang="en-US" sz="2000" dirty="0"/>
+              <a:rPr lang="en-US" sz="1900" dirty="0"/>
               <a:t> 1.x versions are obsolete</a:t>
             </a:r>
           </a:p>
           <a:p>
-            <a:endParaRPr lang="en-US" sz="2000" dirty="0"/>
-          </a:p>
-          <a:p>
-            <a:r>
-              <a:rPr lang="en-US" sz="2000" dirty="0"/>
+            <a:endParaRPr lang="en-US" sz="1900" dirty="0"/>
+          </a:p>
+          <a:p>
+            <a:r>
+              <a:rPr lang="en-US" sz="1900" dirty="0"/>
               <a:t>Python 2.0 – 2000</a:t>
             </a:r>
           </a:p>
           <a:p>
             <a:r>
-              <a:rPr lang="en-US" sz="2000" dirty="0"/>
+              <a:rPr lang="en-US" sz="1900" dirty="0"/>
               <a:t>   </a:t>
             </a:r>
             <a:r>
-              <a:rPr lang="en-US" sz="2000" dirty="0">
+              <a:rPr lang="en-US" sz="1900" dirty="0">
                 <a:latin typeface="Arial" panose="020B0604020202020204" pitchFamily="34" charset="0"/>
                 <a:cs typeface="Arial" panose="020B0604020202020204" pitchFamily="34" charset="0"/>
               </a:rPr>
               <a:t>→</a:t>
             </a:r>
             <a:r>
-              <a:rPr lang="en-US" sz="2000" dirty="0"/>
+              <a:rPr lang="en-US" sz="1900" dirty="0"/>
               <a:t> Latest and final: 2.7 in 2010</a:t>
             </a:r>
           </a:p>
           <a:p>
-            <a:endParaRPr lang="en-US" sz="2000" dirty="0"/>
-          </a:p>
-          <a:p>
-            <a:r>
-              <a:rPr lang="en-US" sz="2000" dirty="0"/>
+            <a:endParaRPr lang="en-US" sz="1900" dirty="0"/>
+          </a:p>
+          <a:p>
+            <a:r>
+              <a:rPr lang="en-US" sz="1900" dirty="0"/>
               <a:t>Python 3.0 – 2008</a:t>
             </a:r>
           </a:p>
           <a:p>
             <a:r>
-              <a:rPr lang="en-US" sz="2000" dirty="0"/>
+              <a:rPr lang="en-US" sz="1900" dirty="0"/>
               <a:t>    </a:t>
             </a:r>
             <a:r>
-              <a:rPr lang="en-US" sz="2000" dirty="0">
+              <a:rPr lang="en-US" sz="1900" dirty="0">
                 <a:latin typeface="Arial" panose="020B0604020202020204" pitchFamily="34" charset="0"/>
                 <a:cs typeface="Arial" panose="020B0604020202020204" pitchFamily="34" charset="0"/>
               </a:rPr>
               <a:t>→</a:t>
             </a:r>
             <a:r>
-              <a:rPr lang="en-US" sz="2000" dirty="0"/>
-              <a:t> Currently 3.8 (October 2019)</a:t>
-            </a:r>
-          </a:p>
-          <a:p>
-            <a:endParaRPr lang="en-US" sz="2000" dirty="0"/>
-          </a:p>
-          <a:p>
-            <a:r>
-              <a:rPr lang="en-US" sz="2000" dirty="0"/>
-              <a:t>Python 2 will become obsolete in the long run (won’t be maintained past 2020); </a:t>
-            </a:r>
-            <a:r>
-              <a:rPr lang="en-US" sz="2000" b="1" dirty="0"/>
+              <a:rPr lang="en-US" sz="1900" dirty="0"/>
+              <a:t> Currently 3.9 (October 2020)</a:t>
+            </a:r>
+          </a:p>
+          <a:p>
+            <a:endParaRPr lang="en-US" sz="1900" dirty="0"/>
+          </a:p>
+          <a:p>
+            <a:r>
+              <a:rPr lang="en-US" sz="1900" dirty="0"/>
+              <a:t>Maintenance of Python 2 has stopped in 2020. </a:t>
+            </a:r>
+          </a:p>
+          <a:p>
+            <a:r>
+              <a:rPr lang="en-US" sz="1900" b="1" dirty="0"/>
               <a:t>Python 3 is the future.</a:t>
             </a:r>
             <a:r>
-              <a:rPr lang="en-US" dirty="0"/>
-              <a:t> </a:t>
-            </a:r>
-            <a:endParaRPr lang="de-CH" dirty="0"/>
+              <a:rPr lang="en-US" sz="1900" dirty="0"/>
+              <a:t> Don’t start new projects with Python 2!</a:t>
+            </a:r>
+            <a:endParaRPr lang="de-CH" sz="1900" dirty="0"/>
           </a:p>
         </p:txBody>
       </p:sp>
@@ -3963,15 +4050,33 @@
                                   </p:childTnLst>
                                 </p:cTn>
                               </p:par>
+                            </p:childTnLst>
+                          </p:cTn>
+                        </p:par>
+                      </p:childTnLst>
+                    </p:cTn>
+                  </p:par>
+                  <p:par>
+                    <p:cTn id="7" fill="hold">
+                      <p:stCondLst>
+                        <p:cond delay="indefinite"/>
+                      </p:stCondLst>
+                      <p:childTnLst>
+                        <p:par>
+                          <p:cTn id="8" fill="hold">
+                            <p:stCondLst>
+                              <p:cond delay="0"/>
+                            </p:stCondLst>
+                            <p:childTnLst>
                               <p:par>
-                                <p:cTn id="7" presetID="1" presetClass="entr" presetSubtype="0" fill="hold" nodeType="withEffect">
+                                <p:cTn id="9" presetID="1" presetClass="entr" presetSubtype="0" fill="hold" nodeType="clickEffect">
                                   <p:stCondLst>
                                     <p:cond delay="0"/>
                                   </p:stCondLst>
                                   <p:childTnLst>
                                     <p:set>
                                       <p:cBhvr>
-                                        <p:cTn id="8" dur="1" fill="hold">
+                                        <p:cTn id="10" dur="1" fill="hold">
                                           <p:stCondLst>
                                             <p:cond delay="0"/>
                                           </p:stCondLst>
@@ -4001,26 +4106,26 @@
                     </p:cTn>
                   </p:par>
                   <p:par>
-                    <p:cTn id="9" fill="hold">
+                    <p:cTn id="11" fill="hold">
                       <p:stCondLst>
                         <p:cond delay="indefinite"/>
                       </p:stCondLst>
                       <p:childTnLst>
                         <p:par>
-                          <p:cTn id="10" fill="hold">
+                          <p:cTn id="12" fill="hold">
                             <p:stCondLst>
                               <p:cond delay="0"/>
                             </p:stCondLst>
                             <p:childTnLst>
                               <p:par>
-                                <p:cTn id="11" presetID="1" presetClass="entr" presetSubtype="0" fill="hold" nodeType="clickEffect">
+                                <p:cTn id="13" presetID="1" presetClass="entr" presetSubtype="0" fill="hold" nodeType="clickEffect">
                                   <p:stCondLst>
                                     <p:cond delay="0"/>
                                   </p:stCondLst>
                                   <p:childTnLst>
                                     <p:set>
                                       <p:cBhvr>
-                                        <p:cTn id="12" dur="1" fill="hold">
+                                        <p:cTn id="14" dur="1" fill="hold">
                                           <p:stCondLst>
                                             <p:cond delay="0"/>
                                           </p:stCondLst>
@@ -4044,14 +4149,14 @@
                                 </p:cTn>
                               </p:par>
                               <p:par>
-                                <p:cTn id="13" presetID="1" presetClass="entr" presetSubtype="0" fill="hold" nodeType="withEffect">
+                                <p:cTn id="15" presetID="1" presetClass="entr" presetSubtype="0" fill="hold" nodeType="withEffect">
                                   <p:stCondLst>
                                     <p:cond delay="0"/>
                                   </p:stCondLst>
                                   <p:childTnLst>
                                     <p:set>
                                       <p:cBhvr>
-                                        <p:cTn id="14" dur="1" fill="hold">
+                                        <p:cTn id="16" dur="1" fill="hold">
                                           <p:stCondLst>
                                             <p:cond delay="0"/>
                                           </p:stCondLst>
@@ -4074,26 +4179,8 @@
                                   </p:childTnLst>
                                 </p:cTn>
                               </p:par>
-                            </p:childTnLst>
-                          </p:cTn>
-                        </p:par>
-                      </p:childTnLst>
-                    </p:cTn>
-                  </p:par>
-                  <p:par>
-                    <p:cTn id="15" fill="hold">
-                      <p:stCondLst>
-                        <p:cond delay="indefinite"/>
-                      </p:stCondLst>
-                      <p:childTnLst>
-                        <p:par>
-                          <p:cTn id="16" fill="hold">
-                            <p:stCondLst>
-                              <p:cond delay="0"/>
-                            </p:stCondLst>
-                            <p:childTnLst>
                               <p:par>
-                                <p:cTn id="17" presetID="1" presetClass="entr" presetSubtype="0" fill="hold" nodeType="clickEffect">
+                                <p:cTn id="17" presetID="1" presetClass="entr" presetSubtype="0" fill="hold" nodeType="withEffect">
                                   <p:stCondLst>
                                     <p:cond delay="0"/>
                                   </p:stCondLst>
@@ -4154,33 +4241,15 @@
                                   </p:childTnLst>
                                 </p:cTn>
                               </p:par>
-                            </p:childTnLst>
-                          </p:cTn>
-                        </p:par>
-                      </p:childTnLst>
-                    </p:cTn>
-                  </p:par>
-                  <p:par>
-                    <p:cTn id="21" fill="hold">
-                      <p:stCondLst>
-                        <p:cond delay="indefinite"/>
-                      </p:stCondLst>
-                      <p:childTnLst>
-                        <p:par>
-                          <p:cTn id="22" fill="hold">
-                            <p:stCondLst>
-                              <p:cond delay="0"/>
-                            </p:stCondLst>
-                            <p:childTnLst>
                               <p:par>
-                                <p:cTn id="23" presetID="1" presetClass="entr" presetSubtype="0" fill="hold" nodeType="clickEffect">
+                                <p:cTn id="21" presetID="1" presetClass="entr" presetSubtype="0" fill="hold" nodeType="withEffect">
                                   <p:stCondLst>
                                     <p:cond delay="0"/>
                                   </p:stCondLst>
                                   <p:childTnLst>
                                     <p:set>
                                       <p:cBhvr>
-                                        <p:cTn id="24" dur="1" fill="hold">
+                                        <p:cTn id="22" dur="1" fill="hold">
                                           <p:stCondLst>
                                             <p:cond delay="0"/>
                                           </p:stCondLst>
@@ -4204,14 +4273,14 @@
                                 </p:cTn>
                               </p:par>
                               <p:par>
-                                <p:cTn id="25" presetID="1" presetClass="entr" presetSubtype="0" fill="hold" nodeType="withEffect">
+                                <p:cTn id="23" presetID="1" presetClass="entr" presetSubtype="0" fill="hold" nodeType="withEffect">
                                   <p:stCondLst>
                                     <p:cond delay="0"/>
                                   </p:stCondLst>
                                   <p:childTnLst>
                                     <p:set>
                                       <p:cBhvr>
-                                        <p:cTn id="26" dur="1" fill="hold">
+                                        <p:cTn id="24" dur="1" fill="hold">
                                           <p:stCondLst>
                                             <p:cond delay="0"/>
                                           </p:stCondLst>
@@ -4241,19 +4310,50 @@
                     </p:cTn>
                   </p:par>
                   <p:par>
-                    <p:cTn id="27" fill="hold">
+                    <p:cTn id="25" fill="hold">
                       <p:stCondLst>
                         <p:cond delay="indefinite"/>
                       </p:stCondLst>
                       <p:childTnLst>
                         <p:par>
-                          <p:cTn id="28" fill="hold">
+                          <p:cTn id="26" fill="hold">
                             <p:stCondLst>
                               <p:cond delay="0"/>
                             </p:stCondLst>
                             <p:childTnLst>
                               <p:par>
-                                <p:cTn id="29" presetID="1" presetClass="entr" presetSubtype="0" fill="hold" nodeType="clickEffect">
+                                <p:cTn id="27" presetID="1" presetClass="entr" presetSubtype="0" fill="hold" nodeType="clickEffect">
+                                  <p:stCondLst>
+                                    <p:cond delay="0"/>
+                                  </p:stCondLst>
+                                  <p:childTnLst>
+                                    <p:set>
+                                      <p:cBhvr>
+                                        <p:cTn id="28" dur="1" fill="hold">
+                                          <p:stCondLst>
+                                            <p:cond delay="0"/>
+                                          </p:stCondLst>
+                                        </p:cTn>
+                                        <p:tgtEl>
+                                          <p:spTgt spid="7">
+                                            <p:txEl>
+                                              <p:pRg st="13" end="13"/>
+                                            </p:txEl>
+                                          </p:spTgt>
+                                        </p:tgtEl>
+                                        <p:attrNameLst>
+                                          <p:attrName>style.visibility</p:attrName>
+                                        </p:attrNameLst>
+                                      </p:cBhvr>
+                                      <p:to>
+                                        <p:strVal val="visible"/>
+                                      </p:to>
+                                    </p:set>
+                                  </p:childTnLst>
+                                </p:cTn>
+                              </p:par>
+                              <p:par>
+                                <p:cTn id="29" presetID="1" presetClass="entr" presetSubtype="0" fill="hold" nodeType="withEffect">
                                   <p:stCondLst>
                                     <p:cond delay="0"/>
                                   </p:stCondLst>
@@ -4268,7 +4368,7 @@
                                         <p:tgtEl>
                                           <p:spTgt spid="7">
                                             <p:txEl>
-                                              <p:pRg st="13" end="13"/>
+                                              <p:pRg st="14" end="14"/>
                                             </p:txEl>
                                           </p:spTgt>
                                         </p:tgtEl>
@@ -4349,7 +4449,7 @@
         </p:nvSpPr>
         <p:spPr>
           <a:xfrm>
-            <a:off x="315686" y="183697"/>
+            <a:off x="156029" y="63183"/>
             <a:ext cx="10515600" cy="796018"/>
           </a:xfrm>
         </p:spPr>
@@ -4360,8 +4460,8 @@
           <a:lstStyle/>
           <a:p>
             <a:r>
-              <a:rPr lang="en-US" sz="3400" dirty="0"/>
-              <a:t>Python has become a mainstream language</a:t>
+              <a:rPr lang="en-US" sz="3000" dirty="0"/>
+              <a:t>Python has become a mainstream programming language</a:t>
             </a:r>
           </a:p>
         </p:txBody>
@@ -4416,8 +4516,8 @@
         </p:nvSpPr>
         <p:spPr>
           <a:xfrm>
-            <a:off x="8469087" y="1179334"/>
-            <a:ext cx="3344460" cy="4247317"/>
+            <a:off x="8374743" y="1262823"/>
+            <a:ext cx="3373489" cy="4801314"/>
           </a:xfrm>
           <a:prstGeom prst="rect">
             <a:avLst/>
@@ -4431,7 +4531,7 @@
           <a:p>
             <a:r>
               <a:rPr lang="en-US" dirty="0"/>
-              <a:t>Popularity due to ease of use, great community and open-source ecosystem.</a:t>
+              <a:t>Easy to learn and use, great community and open-source ecosystem (over 250,000 packages available as of 2020!).</a:t>
             </a:r>
           </a:p>
           <a:p>
@@ -4440,7 +4540,7 @@
           <a:p>
             <a:r>
               <a:rPr lang="en-US" dirty="0"/>
-              <a:t>Also: it’s free (unlike proprietary software such as MATLAB).</a:t>
+              <a:t>It’s free forever (unlike proprietary software such as MATLAB, LabVIEW, …).</a:t>
             </a:r>
           </a:p>
           <a:p>
@@ -4449,7 +4549,7 @@
           <a:p>
             <a:r>
               <a:rPr lang="en-US" dirty="0"/>
-              <a:t>Increasing use by large IT companies: Google, Amazon, Instagram, Dropbox, Spotify, Netflix…</a:t>
+              <a:t>Increasing use by large tech companies: Google, Amazon, Instagram, Dropbox, Spotify, Netflix…</a:t>
             </a:r>
           </a:p>
           <a:p>
@@ -4458,7 +4558,7 @@
           <a:p>
             <a:r>
               <a:rPr lang="en-US" dirty="0"/>
-              <a:t>… and it’s the most popular language for machine learning applications.</a:t>
+              <a:t>… and it’s the most popular choice for machine learning applications.</a:t>
             </a:r>
           </a:p>
         </p:txBody>
@@ -4478,7 +4578,7 @@
         <p:spPr>
           <a:xfrm>
             <a:off x="443768" y="6027972"/>
-            <a:ext cx="7445829" cy="646331"/>
+            <a:ext cx="7219775" cy="646331"/>
           </a:xfrm>
           <a:prstGeom prst="rect">
             <a:avLst/>
@@ -4493,7 +4593,17 @@
           <a:p>
             <a:r>
               <a:rPr lang="en-US" dirty="0"/>
-              <a:t>Among major programming languages, Python has seen the fastest growth over the past decade. </a:t>
+              <a:t>Among major programming languages, Python has seen the fastest growth over the past decade. See also </a:t>
+            </a:r>
+            <a:r>
+              <a:rPr lang="en-US" dirty="0">
+                <a:hlinkClick r:id="rId3"/>
+              </a:rPr>
+              <a:t>https://tiobe.com/tiobe-index/</a:t>
+            </a:r>
+            <a:r>
+              <a:rPr lang="en-US" dirty="0"/>
+              <a:t>  </a:t>
             </a:r>
           </a:p>
         </p:txBody>
@@ -4816,8 +4926,8 @@
         </p:nvSpPr>
         <p:spPr>
           <a:xfrm>
-            <a:off x="771037" y="1343039"/>
-            <a:ext cx="3368432" cy="4832092"/>
+            <a:off x="669437" y="1538982"/>
+            <a:ext cx="3898618" cy="4154984"/>
           </a:xfrm>
           <a:prstGeom prst="rect">
             <a:avLst/>
@@ -4848,7 +4958,7 @@
             </a:r>
             <a:r>
               <a:rPr lang="en-US" sz="2200" dirty="0"/>
-              <a:t> files) is first first compiled into </a:t>
+              <a:t> files) is first compiled into </a:t>
             </a:r>
             <a:r>
               <a:rPr lang="en-US" sz="2200" i="1" dirty="0"/>
@@ -4864,7 +4974,7 @@
             </a:r>
             <a:r>
               <a:rPr lang="en-US" sz="2200" dirty="0"/>
-              <a:t> files), an intermediate lower-level language for faster execution (but slower than </a:t>
+              <a:t> files), an intermediate lower-level language for faster execution (but much slower than </a:t>
             </a:r>
             <a:r>
               <a:rPr lang="en-US" sz="2200" i="1" dirty="0"/>
@@ -4881,7 +4991,7 @@
           <a:p>
             <a:r>
               <a:rPr lang="en-US" sz="2200" dirty="0"/>
-              <a:t>Byte-code is run on the Python Virtual Machine.</a:t>
+              <a:t>Byte code is run on the Python Virtual Machine.</a:t>
             </a:r>
           </a:p>
           <a:p>
@@ -4974,7 +5084,7 @@
           <a:p>
             <a:r>
               <a:rPr lang="en-US" dirty="0"/>
-              <a:t>a browser-based inter-active programming environment (</a:t>
+              <a:t>A browser-based inter-active programming environment (</a:t>
             </a:r>
             <a:r>
               <a:rPr lang="en-US" b="1" dirty="0"/>
@@ -4998,7 +5108,7 @@
             </a:r>
             <a:r>
               <a:rPr lang="en-US" dirty="0"/>
-              <a:t>) ideal for </a:t>
+              <a:t>), ideal for </a:t>
             </a:r>
           </a:p>
           <a:p>
@@ -5039,10 +5149,10 @@
           <a:p>
             <a:pPr algn="ctr"/>
             <a:r>
-              <a:rPr lang="en-US" sz="2400" dirty="0"/>
+              <a:rPr lang="en-US" sz="2800" dirty="0"/>
               <a:t>How Python is commonly used</a:t>
             </a:r>
-            <a:endParaRPr lang="de-CH" sz="2400" dirty="0"/>
+            <a:endParaRPr lang="de-CH" sz="2800" dirty="0"/>
           </a:p>
         </p:txBody>
       </p:sp>
@@ -5187,7 +5297,7 @@
         <p:spPr>
           <a:xfrm>
             <a:off x="359739" y="880360"/>
-            <a:ext cx="3773716" cy="923330"/>
+            <a:ext cx="3773716" cy="1200329"/>
           </a:xfrm>
           <a:prstGeom prst="rect">
             <a:avLst/>
@@ -5202,15 +5312,27 @@
           <a:p>
             <a:r>
               <a:rPr lang="en-US" dirty="0"/>
-              <a:t>Run from the </a:t>
+              <a:t>Python programs (usually tools) </a:t>
+            </a:r>
+          </a:p>
+          <a:p>
+            <a:r>
+              <a:rPr lang="en-US" dirty="0"/>
+              <a:t>that are run from the </a:t>
             </a:r>
             <a:r>
               <a:rPr lang="en-US" b="1" dirty="0"/>
-              <a:t>console/command line/terminal</a:t>
+              <a:t>command line/ terminal/shell/console</a:t>
             </a:r>
             <a:r>
               <a:rPr lang="en-US" dirty="0"/>
-              <a:t>. No graphical user interface, only text. </a:t>
+              <a:t>: </a:t>
+            </a:r>
+          </a:p>
+          <a:p>
+            <a:r>
+              <a:rPr lang="en-US" dirty="0"/>
+              <a:t>No graphical user interface, only text. </a:t>
             </a:r>
           </a:p>
         </p:txBody>
@@ -5230,20 +5352,20 @@
           <p:nvPr>
             <p:extLst>
               <p:ext uri="{D42A27DB-BD31-4B8C-83A1-F6EECF244321}">
-                <p14:modId xmlns:p14="http://schemas.microsoft.com/office/powerpoint/2010/main" val="1265108211"/>
+                <p14:modId xmlns:p14="http://schemas.microsoft.com/office/powerpoint/2010/main" val="900137077"/>
               </p:ext>
             </p:extLst>
           </p:nvPr>
         </p:nvGraphicFramePr>
         <p:xfrm>
-          <a:off x="549451" y="1897007"/>
+          <a:off x="549451" y="2252112"/>
           <a:ext cx="2698458" cy="3063986"/>
         </p:xfrm>
         <a:graphic>
           <a:graphicData uri="http://schemas.openxmlformats.org/presentationml/2006/ole">
             <mc:AlternateContent xmlns:mc="http://schemas.openxmlformats.org/markup-compatibility/2006">
               <mc:Choice xmlns:v="urn:schemas-microsoft-com:vml" Requires="v">
-                <p:oleObj spid="_x0000_s1039" r:id="rId5" imgW="9536400" imgH="10844280" progId="">
+                <p:oleObj spid="_x0000_s1050" r:id="rId5" imgW="9536400" imgH="10844280" progId="">
                   <p:embed/>
                 </p:oleObj>
               </mc:Choice>
@@ -5264,7 +5386,7 @@
                     </p:blipFill>
                     <p:spPr>
                       <a:xfrm>
-                        <a:off x="549451" y="1897007"/>
+                        <a:off x="549451" y="2252112"/>
                         <a:ext cx="2698458" cy="3063986"/>
                       </a:xfrm>
                       <a:prstGeom prst="rect">
@@ -6135,12 +6257,16 @@
           <a:lstStyle/>
           <a:p>
             <a:r>
+              <a:rPr lang="en-US" sz="3000" dirty="0"/>
+              <a:t>We will use </a:t>
+            </a:r>
+            <a:r>
               <a:rPr lang="en-US" sz="3000" dirty="0" err="1"/>
               <a:t>Jupyter</a:t>
             </a:r>
             <a:r>
               <a:rPr lang="en-US" sz="3000" dirty="0"/>
-              <a:t> Notebook</a:t>
+              <a:t> Notebook for this session</a:t>
             </a:r>
             <a:endParaRPr lang="de-CH" sz="3000" dirty="0"/>
           </a:p>
@@ -6318,6 +6444,379 @@
       </p:grpSpPr>
       <p:sp>
         <p:nvSpPr>
+          <p:cNvPr id="4" name="Content Placeholder 2">
+            <a:extLst>
+              <a:ext uri="{FF2B5EF4-FFF2-40B4-BE49-F238E27FC236}">
+                <a16:creationId xmlns:a16="http://schemas.microsoft.com/office/drawing/2014/main" id="{79D4B4BD-7B7D-47E1-BB92-6AEF61EC4CBD}"/>
+              </a:ext>
+            </a:extLst>
+          </p:cNvPr>
+          <p:cNvSpPr txBox="1">
+            <a:spLocks/>
+          </p:cNvSpPr>
+          <p:nvPr/>
+        </p:nvSpPr>
+        <p:spPr>
+          <a:xfrm>
+            <a:off x="1037771" y="1335311"/>
+            <a:ext cx="10014858" cy="4223659"/>
+          </a:xfrm>
+          <a:prstGeom prst="rect">
+            <a:avLst/>
+          </a:prstGeom>
+        </p:spPr>
+        <p:txBody>
+          <a:bodyPr vert="horz" lIns="91440" tIns="45720" rIns="91440" bIns="45720" rtlCol="0">
+            <a:normAutofit/>
+          </a:bodyPr>
+          <a:lstStyle>
+            <a:lvl1pPr marL="228600" indent="-228600" algn="l" defTabSz="914400" rtl="0" eaLnBrk="1" latinLnBrk="0" hangingPunct="1">
+              <a:lnSpc>
+                <a:spcPct val="90000"/>
+              </a:lnSpc>
+              <a:spcBef>
+                <a:spcPts val="1000"/>
+              </a:spcBef>
+              <a:buFont typeface="Arial" panose="020B0604020202020204" pitchFamily="34" charset="0"/>
+              <a:buChar char="•"/>
+              <a:defRPr sz="2800" kern="1200">
+                <a:solidFill>
+                  <a:schemeClr val="tx1"/>
+                </a:solidFill>
+                <a:latin typeface="+mn-lt"/>
+                <a:ea typeface="+mn-ea"/>
+                <a:cs typeface="+mn-cs"/>
+              </a:defRPr>
+            </a:lvl1pPr>
+            <a:lvl2pPr marL="685800" indent="-228600" algn="l" defTabSz="914400" rtl="0" eaLnBrk="1" latinLnBrk="0" hangingPunct="1">
+              <a:lnSpc>
+                <a:spcPct val="90000"/>
+              </a:lnSpc>
+              <a:spcBef>
+                <a:spcPts val="500"/>
+              </a:spcBef>
+              <a:buFont typeface="Arial" panose="020B0604020202020204" pitchFamily="34" charset="0"/>
+              <a:buChar char="•"/>
+              <a:defRPr sz="2400" kern="1200">
+                <a:solidFill>
+                  <a:schemeClr val="tx1"/>
+                </a:solidFill>
+                <a:latin typeface="+mn-lt"/>
+                <a:ea typeface="+mn-ea"/>
+                <a:cs typeface="+mn-cs"/>
+              </a:defRPr>
+            </a:lvl2pPr>
+            <a:lvl3pPr marL="1143000" indent="-228600" algn="l" defTabSz="914400" rtl="0" eaLnBrk="1" latinLnBrk="0" hangingPunct="1">
+              <a:lnSpc>
+                <a:spcPct val="90000"/>
+              </a:lnSpc>
+              <a:spcBef>
+                <a:spcPts val="500"/>
+              </a:spcBef>
+              <a:buFont typeface="Arial" panose="020B0604020202020204" pitchFamily="34" charset="0"/>
+              <a:buChar char="•"/>
+              <a:defRPr sz="2000" kern="1200">
+                <a:solidFill>
+                  <a:schemeClr val="tx1"/>
+                </a:solidFill>
+                <a:latin typeface="+mn-lt"/>
+                <a:ea typeface="+mn-ea"/>
+                <a:cs typeface="+mn-cs"/>
+              </a:defRPr>
+            </a:lvl3pPr>
+            <a:lvl4pPr marL="1600200" indent="-228600" algn="l" defTabSz="914400" rtl="0" eaLnBrk="1" latinLnBrk="0" hangingPunct="1">
+              <a:lnSpc>
+                <a:spcPct val="90000"/>
+              </a:lnSpc>
+              <a:spcBef>
+                <a:spcPts val="500"/>
+              </a:spcBef>
+              <a:buFont typeface="Arial" panose="020B0604020202020204" pitchFamily="34" charset="0"/>
+              <a:buChar char="•"/>
+              <a:defRPr sz="1800" kern="1200">
+                <a:solidFill>
+                  <a:schemeClr val="tx1"/>
+                </a:solidFill>
+                <a:latin typeface="+mn-lt"/>
+                <a:ea typeface="+mn-ea"/>
+                <a:cs typeface="+mn-cs"/>
+              </a:defRPr>
+            </a:lvl4pPr>
+            <a:lvl5pPr marL="2057400" indent="-228600" algn="l" defTabSz="914400" rtl="0" eaLnBrk="1" latinLnBrk="0" hangingPunct="1">
+              <a:lnSpc>
+                <a:spcPct val="90000"/>
+              </a:lnSpc>
+              <a:spcBef>
+                <a:spcPts val="500"/>
+              </a:spcBef>
+              <a:buFont typeface="Arial" panose="020B0604020202020204" pitchFamily="34" charset="0"/>
+              <a:buChar char="•"/>
+              <a:defRPr sz="1800" kern="1200">
+                <a:solidFill>
+                  <a:schemeClr val="tx1"/>
+                </a:solidFill>
+                <a:latin typeface="+mn-lt"/>
+                <a:ea typeface="+mn-ea"/>
+                <a:cs typeface="+mn-cs"/>
+              </a:defRPr>
+            </a:lvl5pPr>
+            <a:lvl6pPr marL="2514600" indent="-228600" algn="l" defTabSz="914400" rtl="0" eaLnBrk="1" latinLnBrk="0" hangingPunct="1">
+              <a:lnSpc>
+                <a:spcPct val="90000"/>
+              </a:lnSpc>
+              <a:spcBef>
+                <a:spcPts val="500"/>
+              </a:spcBef>
+              <a:buFont typeface="Arial" panose="020B0604020202020204" pitchFamily="34" charset="0"/>
+              <a:buChar char="•"/>
+              <a:defRPr sz="1800" kern="1200">
+                <a:solidFill>
+                  <a:schemeClr val="tx1"/>
+                </a:solidFill>
+                <a:latin typeface="+mn-lt"/>
+                <a:ea typeface="+mn-ea"/>
+                <a:cs typeface="+mn-cs"/>
+              </a:defRPr>
+            </a:lvl6pPr>
+            <a:lvl7pPr marL="2971800" indent="-228600" algn="l" defTabSz="914400" rtl="0" eaLnBrk="1" latinLnBrk="0" hangingPunct="1">
+              <a:lnSpc>
+                <a:spcPct val="90000"/>
+              </a:lnSpc>
+              <a:spcBef>
+                <a:spcPts val="500"/>
+              </a:spcBef>
+              <a:buFont typeface="Arial" panose="020B0604020202020204" pitchFamily="34" charset="0"/>
+              <a:buChar char="•"/>
+              <a:defRPr sz="1800" kern="1200">
+                <a:solidFill>
+                  <a:schemeClr val="tx1"/>
+                </a:solidFill>
+                <a:latin typeface="+mn-lt"/>
+                <a:ea typeface="+mn-ea"/>
+                <a:cs typeface="+mn-cs"/>
+              </a:defRPr>
+            </a:lvl7pPr>
+            <a:lvl8pPr marL="3429000" indent="-228600" algn="l" defTabSz="914400" rtl="0" eaLnBrk="1" latinLnBrk="0" hangingPunct="1">
+              <a:lnSpc>
+                <a:spcPct val="90000"/>
+              </a:lnSpc>
+              <a:spcBef>
+                <a:spcPts val="500"/>
+              </a:spcBef>
+              <a:buFont typeface="Arial" panose="020B0604020202020204" pitchFamily="34" charset="0"/>
+              <a:buChar char="•"/>
+              <a:defRPr sz="1800" kern="1200">
+                <a:solidFill>
+                  <a:schemeClr val="tx1"/>
+                </a:solidFill>
+                <a:latin typeface="+mn-lt"/>
+                <a:ea typeface="+mn-ea"/>
+                <a:cs typeface="+mn-cs"/>
+              </a:defRPr>
+            </a:lvl8pPr>
+            <a:lvl9pPr marL="3886200" indent="-228600" algn="l" defTabSz="914400" rtl="0" eaLnBrk="1" latinLnBrk="0" hangingPunct="1">
+              <a:lnSpc>
+                <a:spcPct val="90000"/>
+              </a:lnSpc>
+              <a:spcBef>
+                <a:spcPts val="500"/>
+              </a:spcBef>
+              <a:buFont typeface="Arial" panose="020B0604020202020204" pitchFamily="34" charset="0"/>
+              <a:buChar char="•"/>
+              <a:defRPr sz="1800" kern="1200">
+                <a:solidFill>
+                  <a:schemeClr val="tx1"/>
+                </a:solidFill>
+                <a:latin typeface="+mn-lt"/>
+                <a:ea typeface="+mn-ea"/>
+                <a:cs typeface="+mn-cs"/>
+              </a:defRPr>
+            </a:lvl9pPr>
+          </a:lstStyle>
+          <a:p>
+            <a:pPr marL="0" indent="0">
+              <a:lnSpc>
+                <a:spcPct val="100000"/>
+              </a:lnSpc>
+              <a:spcAft>
+                <a:spcPts val="1600"/>
+              </a:spcAft>
+              <a:buFont typeface="Arial" panose="020B0604020202020204" pitchFamily="34" charset="0"/>
+              <a:buNone/>
+            </a:pPr>
+            <a:r>
+              <a:rPr lang="en-US" sz="3000" dirty="0"/>
+              <a:t>Part I: Introduction to basic programming concepts in Python</a:t>
+            </a:r>
+          </a:p>
+          <a:p>
+            <a:pPr marL="0" indent="0">
+              <a:lnSpc>
+                <a:spcPct val="100000"/>
+              </a:lnSpc>
+              <a:spcAft>
+                <a:spcPts val="1600"/>
+              </a:spcAft>
+              <a:buNone/>
+            </a:pPr>
+            <a:r>
+              <a:rPr lang="en-US" sz="2400" dirty="0">
+                <a:latin typeface="Arial" panose="020B0604020202020204" pitchFamily="34" charset="0"/>
+                <a:cs typeface="Arial" panose="020B0604020202020204" pitchFamily="34" charset="0"/>
+              </a:rPr>
+              <a:t>→ </a:t>
+            </a:r>
+            <a:r>
+              <a:rPr lang="en-US" sz="2400" dirty="0" err="1"/>
+              <a:t>Jupyter</a:t>
+            </a:r>
+            <a:r>
+              <a:rPr lang="en-US" sz="2400" dirty="0"/>
+              <a:t> Notebook:  </a:t>
+            </a:r>
+            <a:r>
+              <a:rPr lang="en-US" sz="2400" dirty="0" err="1">
+                <a:effectLst>
+                  <a:outerShdw blurRad="38100" dist="38100" dir="2700000" algn="tl">
+                    <a:srgbClr val="000000">
+                      <a:alpha val="43137"/>
+                    </a:srgbClr>
+                  </a:outerShdw>
+                </a:effectLst>
+                <a:latin typeface="Consolas" panose="020B0609020204030204" pitchFamily="49" charset="0"/>
+              </a:rPr>
+              <a:t>python_introduction.ipynb</a:t>
+            </a:r>
+            <a:endParaRPr lang="en-US" sz="2400" dirty="0">
+              <a:effectLst>
+                <a:outerShdw blurRad="38100" dist="38100" dir="2700000" algn="tl">
+                  <a:srgbClr val="000000">
+                    <a:alpha val="43137"/>
+                  </a:srgbClr>
+                </a:outerShdw>
+              </a:effectLst>
+              <a:latin typeface="Consolas" panose="020B0609020204030204" pitchFamily="49" charset="0"/>
+            </a:endParaRPr>
+          </a:p>
+          <a:p>
+            <a:pPr marL="0" indent="0">
+              <a:lnSpc>
+                <a:spcPct val="100000"/>
+              </a:lnSpc>
+              <a:spcAft>
+                <a:spcPts val="1600"/>
+              </a:spcAft>
+              <a:buFont typeface="Arial" panose="020B0604020202020204" pitchFamily="34" charset="0"/>
+              <a:buNone/>
+            </a:pPr>
+            <a:endParaRPr lang="en-US" sz="1200" dirty="0"/>
+          </a:p>
+          <a:p>
+            <a:pPr marL="0" indent="0">
+              <a:lnSpc>
+                <a:spcPct val="100000"/>
+              </a:lnSpc>
+              <a:spcAft>
+                <a:spcPts val="1600"/>
+              </a:spcAft>
+              <a:buFont typeface="Arial" panose="020B0604020202020204" pitchFamily="34" charset="0"/>
+              <a:buNone/>
+            </a:pPr>
+            <a:r>
+              <a:rPr lang="en-US" sz="3000" dirty="0"/>
+              <a:t>Part II (optional): Coding practice </a:t>
+            </a:r>
+          </a:p>
+          <a:p>
+            <a:pPr marL="0" indent="0">
+              <a:lnSpc>
+                <a:spcPct val="100000"/>
+              </a:lnSpc>
+              <a:spcAft>
+                <a:spcPts val="1600"/>
+              </a:spcAft>
+              <a:buNone/>
+            </a:pPr>
+            <a:r>
+              <a:rPr lang="en-US" sz="2400" dirty="0">
+                <a:latin typeface="Arial" panose="020B0604020202020204" pitchFamily="34" charset="0"/>
+                <a:cs typeface="Arial" panose="020B0604020202020204" pitchFamily="34" charset="0"/>
+              </a:rPr>
+              <a:t>→ </a:t>
+            </a:r>
+            <a:r>
+              <a:rPr lang="en-US" sz="2400" dirty="0" err="1"/>
+              <a:t>Jupyter</a:t>
+            </a:r>
+            <a:r>
+              <a:rPr lang="en-US" sz="2400" dirty="0"/>
+              <a:t> Notebook:  </a:t>
+            </a:r>
+            <a:r>
+              <a:rPr lang="en-US" sz="2400" dirty="0" err="1">
+                <a:effectLst>
+                  <a:outerShdw blurRad="38100" dist="38100" dir="2700000" algn="tl">
+                    <a:srgbClr val="000000">
+                      <a:alpha val="43137"/>
+                    </a:srgbClr>
+                  </a:outerShdw>
+                </a:effectLst>
+                <a:latin typeface="Consolas" panose="020B0609020204030204" pitchFamily="49" charset="0"/>
+              </a:rPr>
+              <a:t>coding_practice.ipynb</a:t>
+            </a:r>
+            <a:endParaRPr lang="en-US" sz="2400" dirty="0">
+              <a:effectLst>
+                <a:outerShdw blurRad="38100" dist="38100" dir="2700000" algn="tl">
+                  <a:srgbClr val="000000">
+                    <a:alpha val="43137"/>
+                  </a:srgbClr>
+                </a:outerShdw>
+              </a:effectLst>
+              <a:latin typeface="Consolas" panose="020B0609020204030204" pitchFamily="49" charset="0"/>
+            </a:endParaRPr>
+          </a:p>
+          <a:p>
+            <a:pPr marL="0" indent="0">
+              <a:buFont typeface="Arial" panose="020B0604020202020204" pitchFamily="34" charset="0"/>
+              <a:buNone/>
+            </a:pPr>
+            <a:endParaRPr lang="de-CH" dirty="0"/>
+          </a:p>
+        </p:txBody>
+      </p:sp>
+    </p:spTree>
+    <p:extLst>
+      <p:ext uri="{BB962C8B-B14F-4D97-AF65-F5344CB8AC3E}">
+        <p14:creationId xmlns:p14="http://schemas.microsoft.com/office/powerpoint/2010/main" val="4113914722"/>
+      </p:ext>
+    </p:extLst>
+  </p:cSld>
+  <p:clrMapOvr>
+    <a:masterClrMapping/>
+  </p:clrMapOvr>
+</p:sld>
+</file>
+
+<file path=ppt/slides/slide9.xml><?xml version="1.0" encoding="utf-8"?>
+<p:sld xmlns:a="http://schemas.openxmlformats.org/drawingml/2006/main" xmlns:r="http://schemas.openxmlformats.org/officeDocument/2006/relationships" xmlns:p="http://schemas.openxmlformats.org/presentationml/2006/main">
+  <p:cSld>
+    <p:spTree>
+      <p:nvGrpSpPr>
+        <p:cNvPr id="1" name=""/>
+        <p:cNvGrpSpPr/>
+        <p:nvPr/>
+      </p:nvGrpSpPr>
+      <p:grpSpPr>
+        <a:xfrm>
+          <a:off x="0" y="0"/>
+          <a:ext cx="0" cy="0"/>
+          <a:chOff x="0" y="0"/>
+          <a:chExt cx="0" cy="0"/>
+        </a:xfrm>
+      </p:grpSpPr>
+      <p:sp>
+        <p:nvSpPr>
           <p:cNvPr id="2" name="Title 1">
             <a:extLst>
               <a:ext uri="{FF2B5EF4-FFF2-40B4-BE49-F238E27FC236}">
@@ -6339,11 +6838,13 @@
           </a:xfrm>
         </p:spPr>
         <p:txBody>
-          <a:bodyPr/>
+          <a:bodyPr>
+            <a:normAutofit/>
+          </a:bodyPr>
           <a:lstStyle/>
           <a:p>
             <a:r>
-              <a:rPr lang="en-US" dirty="0"/>
+              <a:rPr lang="en-US" sz="4000" dirty="0"/>
               <a:t>Next steps…</a:t>
             </a:r>
           </a:p>
@@ -6367,8 +6868,8 @@
         </p:nvSpPr>
         <p:spPr>
           <a:xfrm>
-            <a:off x="896257" y="1709511"/>
-            <a:ext cx="10388600" cy="4351338"/>
+            <a:off x="961571" y="1586140"/>
+            <a:ext cx="10087429" cy="4351338"/>
           </a:xfrm>
         </p:spPr>
         <p:txBody>
@@ -6378,115 +6879,99 @@
           <a:lstStyle/>
           <a:p>
             <a:r>
-              <a:rPr lang="en-US" sz="2400" dirty="0"/>
-              <a:t>Try to write short (and ideally useful) programs</a:t>
-            </a:r>
-          </a:p>
-          <a:p>
-            <a:r>
-              <a:rPr lang="en-US" sz="2400" dirty="0"/>
+              <a:rPr lang="en-US" sz="2200" dirty="0"/>
+              <a:t>Try to write short (and ideally useful ;) programs. Think of tasks you could automate with Python to make your work/life easier!</a:t>
+            </a:r>
+          </a:p>
+          <a:p>
+            <a:r>
+              <a:rPr lang="en-US" sz="2200" dirty="0"/>
               <a:t>Use </a:t>
             </a:r>
             <a:r>
-              <a:rPr lang="en-US" sz="2400" dirty="0" err="1"/>
+              <a:rPr lang="en-US" sz="2200" i="1" dirty="0"/>
+              <a:t>stackoverflow.com</a:t>
+            </a:r>
+            <a:r>
+              <a:rPr lang="en-US" sz="2200" dirty="0"/>
+              <a:t> (Google “python how to […]“ – you are almost certain to find advice on </a:t>
+            </a:r>
+            <a:r>
+              <a:rPr lang="en-US" sz="2200" dirty="0" err="1"/>
               <a:t>stackoverflow</a:t>
             </a:r>
             <a:r>
-              <a:rPr lang="en-US" sz="2400" dirty="0"/>
-              <a:t> (Google ‘python how to … ‘ – you are almost certain to find advice on </a:t>
-            </a:r>
-            <a:r>
-              <a:rPr lang="en-US" sz="2400" dirty="0" err="1"/>
-              <a:t>stackoverflow</a:t>
-            </a:r>
-            <a:r>
-              <a:rPr lang="en-US" sz="2400" dirty="0"/>
+              <a:rPr lang="en-US" sz="2200" dirty="0"/>
               <a:t>). Don’t just copy/paste, but try to understand! </a:t>
             </a:r>
           </a:p>
           <a:p>
             <a:r>
-              <a:rPr lang="en-US" sz="2400" dirty="0"/>
+              <a:rPr lang="en-US" sz="2200" dirty="0"/>
               <a:t>Many courses at </a:t>
             </a:r>
             <a:r>
-              <a:rPr lang="en-US" sz="2400" dirty="0" err="1"/>
+              <a:rPr lang="en-US" sz="2200" dirty="0" err="1"/>
               <a:t>Codecademy</a:t>
             </a:r>
             <a:r>
-              <a:rPr lang="en-US" sz="2400" dirty="0"/>
+              <a:rPr lang="en-US" sz="2200" dirty="0"/>
               <a:t>, </a:t>
             </a:r>
             <a:r>
-              <a:rPr lang="en-US" sz="2400"/>
+              <a:rPr lang="en-US" sz="2200" dirty="0" err="1"/>
               <a:t>DataCamp</a:t>
             </a:r>
             <a:r>
-              <a:rPr lang="en-US" sz="2400" dirty="0"/>
-              <a:t>, </a:t>
-            </a:r>
-            <a:r>
-              <a:rPr lang="en-US" sz="2400" dirty="0">
+              <a:rPr lang="en-US" sz="2200" dirty="0"/>
+              <a:t>, Coursera, Udemy, </a:t>
+            </a:r>
+            <a:r>
+              <a:rPr lang="en-US" sz="2200" dirty="0">
                 <a:hlinkClick r:id="rId2"/>
               </a:rPr>
               <a:t>www.learnpython.org</a:t>
             </a:r>
             <a:r>
-              <a:rPr lang="en-US" sz="2400" dirty="0"/>
+              <a:rPr lang="en-US" sz="2200" dirty="0"/>
               <a:t> …</a:t>
             </a:r>
           </a:p>
           <a:p>
             <a:r>
-              <a:rPr lang="en-US" sz="2400" dirty="0"/>
-              <a:t>Look for tutorials for </a:t>
-            </a:r>
-            <a:r>
-              <a:rPr lang="en-US" sz="2400" dirty="0" err="1"/>
-              <a:t>numpy</a:t>
-            </a:r>
-            <a:r>
-              <a:rPr lang="en-US" sz="2400" dirty="0"/>
-              <a:t>, matplotlib, </a:t>
-            </a:r>
-            <a:r>
-              <a:rPr lang="en-US" sz="2400" dirty="0" err="1"/>
-              <a:t>scipy</a:t>
-            </a:r>
-            <a:r>
-              <a:rPr lang="en-US" sz="2400" dirty="0"/>
-              <a:t> and pandas to get started with data science with Python </a:t>
-            </a:r>
-          </a:p>
-          <a:p>
-            <a:r>
-              <a:rPr lang="en-US" sz="2400" dirty="0"/>
+              <a:rPr lang="en-US" sz="2200" dirty="0"/>
+              <a:t>Look for tutorials for NumPy, Matplotlib, SciPy and pandas to get started with Python for data science. </a:t>
+            </a:r>
+          </a:p>
+          <a:p>
+            <a:r>
+              <a:rPr lang="en-US" sz="2200" dirty="0"/>
               <a:t>Resources for beginners who are already familiar with programming: </a:t>
             </a:r>
             <a:r>
-              <a:rPr lang="en-US" sz="2400" dirty="0">
+              <a:rPr lang="en-US" sz="2200" dirty="0">
                 <a:hlinkClick r:id="rId3"/>
               </a:rPr>
               <a:t>https://wiki.python.org/moin/BeginnersGuide/Programmers</a:t>
             </a:r>
             <a:r>
-              <a:rPr lang="en-US" sz="2400" dirty="0"/>
+              <a:rPr lang="en-US" sz="2200" dirty="0"/>
               <a:t> </a:t>
             </a:r>
           </a:p>
           <a:p>
             <a:r>
-              <a:rPr lang="en-US" sz="2400" dirty="0"/>
+              <a:rPr lang="en-US" sz="2200" dirty="0"/>
               <a:t>Resources for beginners with no programming experience: </a:t>
             </a:r>
             <a:r>
-              <a:rPr lang="en-US" sz="2400" dirty="0">
+              <a:rPr lang="en-US" sz="2200" dirty="0">
                 <a:hlinkClick r:id="rId4"/>
               </a:rPr>
               <a:t>https://wiki.python.org/moin/BeginnersGuide/NonProgrammers</a:t>
             </a:r>
             <a:r>
-              <a:rPr lang="en-US" sz="2400" dirty="0"/>
+              <a:rPr lang="en-US" sz="2200" dirty="0"/>
               <a:t> </a:t>
             </a:r>
           </a:p>

</xml_diff>